<commit_message>
Modified DG diagrams to include Attendance in the Model
</commit_message>
<xml_diff>
--- a/docs/diagrams/ModelComponentClassBetterOopDiagram.pptx
+++ b/docs/diagrams/ModelComponentClassBetterOopDiagram.pptx
@@ -8,7 +8,7 @@
     <p:notesMasterId r:id="rId3"/>
   </p:notesMasterIdLst>
   <p:sldIdLst>
-    <p:sldId id="264" r:id="rId2"/>
+    <p:sldId id="265" r:id="rId2"/>
   </p:sldIdLst>
   <p:sldSz cx="9144000" cy="6858000" type="screen4x3"/>
   <p:notesSz cx="6858000" cy="9144000"/>
@@ -208,7 +208,7 @@
           <a:p>
             <a:fld id="{F5CC4B3F-88C1-4FFA-B1B6-F41C21DC6924}" type="datetimeFigureOut">
               <a:rPr lang="en-US" smtClean="0"/>
-              <a:t>10/30/2018</a:t>
+              <a:t>11/7/2018</a:t>
             </a:fld>
             <a:endParaRPr lang="en-US"/>
           </a:p>
@@ -654,7 +654,7 @@
           <a:p>
             <a:fld id="{78C97017-6FC3-485B-9764-EAC9E56C1D49}" type="datetimeFigureOut">
               <a:rPr lang="en-US" smtClean="0"/>
-              <a:t>10/30/2018</a:t>
+              <a:t>11/7/2018</a:t>
             </a:fld>
             <a:endParaRPr lang="en-US"/>
           </a:p>
@@ -822,7 +822,7 @@
           <a:p>
             <a:fld id="{78C97017-6FC3-485B-9764-EAC9E56C1D49}" type="datetimeFigureOut">
               <a:rPr lang="en-US" smtClean="0"/>
-              <a:t>10/30/2018</a:t>
+              <a:t>11/7/2018</a:t>
             </a:fld>
             <a:endParaRPr lang="en-US"/>
           </a:p>
@@ -1000,7 +1000,7 @@
           <a:p>
             <a:fld id="{78C97017-6FC3-485B-9764-EAC9E56C1D49}" type="datetimeFigureOut">
               <a:rPr lang="en-US" smtClean="0"/>
-              <a:t>10/30/2018</a:t>
+              <a:t>11/7/2018</a:t>
             </a:fld>
             <a:endParaRPr lang="en-US"/>
           </a:p>
@@ -1168,7 +1168,7 @@
           <a:p>
             <a:fld id="{78C97017-6FC3-485B-9764-EAC9E56C1D49}" type="datetimeFigureOut">
               <a:rPr lang="en-US" smtClean="0"/>
-              <a:t>10/30/2018</a:t>
+              <a:t>11/7/2018</a:t>
             </a:fld>
             <a:endParaRPr lang="en-US"/>
           </a:p>
@@ -1413,7 +1413,7 @@
           <a:p>
             <a:fld id="{78C97017-6FC3-485B-9764-EAC9E56C1D49}" type="datetimeFigureOut">
               <a:rPr lang="en-US" smtClean="0"/>
-              <a:t>10/30/2018</a:t>
+              <a:t>11/7/2018</a:t>
             </a:fld>
             <a:endParaRPr lang="en-US"/>
           </a:p>
@@ -1698,7 +1698,7 @@
           <a:p>
             <a:fld id="{78C97017-6FC3-485B-9764-EAC9E56C1D49}" type="datetimeFigureOut">
               <a:rPr lang="en-US" smtClean="0"/>
-              <a:t>10/30/2018</a:t>
+              <a:t>11/7/2018</a:t>
             </a:fld>
             <a:endParaRPr lang="en-US"/>
           </a:p>
@@ -2117,7 +2117,7 @@
           <a:p>
             <a:fld id="{78C97017-6FC3-485B-9764-EAC9E56C1D49}" type="datetimeFigureOut">
               <a:rPr lang="en-US" smtClean="0"/>
-              <a:t>10/30/2018</a:t>
+              <a:t>11/7/2018</a:t>
             </a:fld>
             <a:endParaRPr lang="en-US"/>
           </a:p>
@@ -2234,7 +2234,7 @@
           <a:p>
             <a:fld id="{78C97017-6FC3-485B-9764-EAC9E56C1D49}" type="datetimeFigureOut">
               <a:rPr lang="en-US" smtClean="0"/>
-              <a:t>10/30/2018</a:t>
+              <a:t>11/7/2018</a:t>
             </a:fld>
             <a:endParaRPr lang="en-US"/>
           </a:p>
@@ -2329,7 +2329,7 @@
           <a:p>
             <a:fld id="{78C97017-6FC3-485B-9764-EAC9E56C1D49}" type="datetimeFigureOut">
               <a:rPr lang="en-US" smtClean="0"/>
-              <a:t>10/30/2018</a:t>
+              <a:t>11/7/2018</a:t>
             </a:fld>
             <a:endParaRPr lang="en-US"/>
           </a:p>
@@ -2604,7 +2604,7 @@
           <a:p>
             <a:fld id="{78C97017-6FC3-485B-9764-EAC9E56C1D49}" type="datetimeFigureOut">
               <a:rPr lang="en-US" smtClean="0"/>
-              <a:t>10/30/2018</a:t>
+              <a:t>11/7/2018</a:t>
             </a:fld>
             <a:endParaRPr lang="en-US"/>
           </a:p>
@@ -2856,7 +2856,7 @@
           <a:p>
             <a:fld id="{78C97017-6FC3-485B-9764-EAC9E56C1D49}" type="datetimeFigureOut">
               <a:rPr lang="en-US" smtClean="0"/>
-              <a:t>10/30/2018</a:t>
+              <a:t>11/7/2018</a:t>
             </a:fld>
             <a:endParaRPr lang="en-US"/>
           </a:p>
@@ -3067,7 +3067,7 @@
           <a:p>
             <a:fld id="{78C97017-6FC3-485B-9764-EAC9E56C1D49}" type="datetimeFigureOut">
               <a:rPr lang="en-US" smtClean="0"/>
-              <a:t>10/30/2018</a:t>
+              <a:t>11/7/2018</a:t>
             </a:fld>
             <a:endParaRPr lang="en-US"/>
           </a:p>
@@ -3444,10 +3444,10 @@
       </p:grpSpPr>
       <p:sp>
         <p:nvSpPr>
-          <p:cNvPr id="116" name="Rectangle 8">
+          <p:cNvPr id="147" name="Rectangle 8">
             <a:extLst>
               <a:ext uri="{FF2B5EF4-FFF2-40B4-BE49-F238E27FC236}">
-                <a16:creationId xmlns:a16="http://schemas.microsoft.com/office/drawing/2014/main" id="{107C6BE4-C7B6-482B-9C05-A087D4196533}"/>
+                <a16:creationId xmlns:a16="http://schemas.microsoft.com/office/drawing/2014/main" id="{042B5C2C-ACA1-4506-BA32-95B9B2D28664}"/>
               </a:ext>
             </a:extLst>
           </p:cNvPr>
@@ -3456,8 +3456,8 @@
         </p:nvSpPr>
         <p:spPr>
           <a:xfrm>
-            <a:off x="6054183" y="3353971"/>
-            <a:ext cx="352800" cy="346760"/>
+            <a:off x="5755330" y="3797956"/>
+            <a:ext cx="362271" cy="346760"/>
           </a:xfrm>
           <a:prstGeom prst="rect">
             <a:avLst/>
@@ -3510,8 +3510,8 @@
         </p:nvSpPr>
         <p:spPr>
           <a:xfrm>
-            <a:off x="368903" y="1180180"/>
-            <a:ext cx="8171219" cy="3974443"/>
+            <a:off x="76200" y="1222060"/>
+            <a:ext cx="9372600" cy="4355486"/>
           </a:xfrm>
           <a:prstGeom prst="roundRect">
             <a:avLst>
@@ -3571,7 +3571,7 @@
         </p:nvSpPr>
         <p:spPr>
           <a:xfrm>
-            <a:off x="2126218" y="3463240"/>
+            <a:off x="1821418" y="3908397"/>
             <a:ext cx="1093635" cy="346760"/>
           </a:xfrm>
           <a:prstGeom prst="rect">
@@ -3630,7 +3630,7 @@
         </p:nvSpPr>
         <p:spPr>
           <a:xfrm rot="16200000">
-            <a:off x="910586" y="3097750"/>
+            <a:off x="605786" y="3542907"/>
             <a:ext cx="1093635" cy="346760"/>
           </a:xfrm>
           <a:prstGeom prst="rect">
@@ -3687,18 +3687,18 @@
           <p:cNvCxnSpPr>
             <a:cxnSpLocks/>
             <a:stCxn id="9" idx="1"/>
-            <a:endCxn id="116" idx="2"/>
+            <a:endCxn id="147" idx="2"/>
           </p:cNvCxnSpPr>
           <p:nvPr/>
         </p:nvCxnSpPr>
         <p:spPr>
           <a:xfrm rot="5400000" flipH="1" flipV="1">
-            <a:off x="3785384" y="1372750"/>
-            <a:ext cx="117217" cy="4773179"/>
+            <a:off x="3485340" y="1811980"/>
+            <a:ext cx="118389" cy="4783862"/>
           </a:xfrm>
           <a:prstGeom prst="bentConnector3">
             <a:avLst>
-              <a:gd name="adj1" fmla="val -407060"/>
+              <a:gd name="adj1" fmla="val -405264"/>
             </a:avLst>
           </a:prstGeom>
           <a:ln w="19050">
@@ -3734,7 +3734,7 @@
         </p:nvSpPr>
         <p:spPr>
           <a:xfrm rot="16200000">
-            <a:off x="205240" y="2861202"/>
+            <a:off x="-99560" y="3306359"/>
             <a:ext cx="1093635" cy="346760"/>
           </a:xfrm>
           <a:prstGeom prst="rect">
@@ -3804,7 +3804,7 @@
         </p:nvSpPr>
         <p:spPr>
           <a:xfrm rot="16200000">
-            <a:off x="875948" y="2952291"/>
+            <a:off x="571148" y="3397448"/>
             <a:ext cx="270504" cy="175523"/>
           </a:xfrm>
           <a:prstGeom prst="triangle">
@@ -3854,7 +3854,7 @@
         </p:nvCxnSpPr>
         <p:spPr>
           <a:xfrm>
-            <a:off x="1858866" y="3636620"/>
+            <a:off x="1554066" y="4081777"/>
             <a:ext cx="267352" cy="0"/>
           </a:xfrm>
           <a:prstGeom prst="straightConnector1">
@@ -3892,7 +3892,7 @@
         </p:nvCxnSpPr>
         <p:spPr>
           <a:xfrm>
-            <a:off x="159129" y="3040053"/>
+            <a:off x="-145671" y="3485210"/>
             <a:ext cx="419548" cy="2860"/>
           </a:xfrm>
           <a:prstGeom prst="bentConnector3">
@@ -3937,7 +3937,7 @@
         </p:nvCxnSpPr>
         <p:spPr>
           <a:xfrm flipV="1">
-            <a:off x="1098962" y="3040052"/>
+            <a:off x="794162" y="3485209"/>
             <a:ext cx="216105" cy="1"/>
           </a:xfrm>
           <a:prstGeom prst="line">
@@ -3976,7 +3976,7 @@
         </p:nvSpPr>
         <p:spPr>
           <a:xfrm>
-            <a:off x="1622818" y="3549930"/>
+            <a:off x="1318018" y="3995087"/>
             <a:ext cx="236048" cy="173380"/>
           </a:xfrm>
           <a:prstGeom prst="flowChartDecision">
@@ -4021,7 +4021,7 @@
         </p:nvSpPr>
         <p:spPr>
           <a:xfrm>
-            <a:off x="2074318" y="2846162"/>
+            <a:off x="1769518" y="3291319"/>
             <a:ext cx="1490560" cy="334856"/>
           </a:xfrm>
           <a:prstGeom prst="rect">
@@ -4080,7 +4080,7 @@
         </p:nvCxnSpPr>
         <p:spPr>
           <a:xfrm>
-            <a:off x="1873398" y="3003033"/>
+            <a:off x="1568598" y="3448190"/>
             <a:ext cx="200920" cy="10557"/>
           </a:xfrm>
           <a:prstGeom prst="straightConnector1">
@@ -4118,7 +4118,7 @@
         </p:nvSpPr>
         <p:spPr>
           <a:xfrm>
-            <a:off x="1637350" y="2916343"/>
+            <a:off x="1332550" y="3361500"/>
             <a:ext cx="236048" cy="173380"/>
           </a:xfrm>
           <a:prstGeom prst="flowChartDecision">
@@ -4163,7 +4163,7 @@
         </p:nvSpPr>
         <p:spPr>
           <a:xfrm>
-            <a:off x="4195308" y="3353491"/>
+            <a:off x="3890508" y="3798648"/>
             <a:ext cx="1370916" cy="346760"/>
           </a:xfrm>
           <a:prstGeom prst="rect">
@@ -4219,7 +4219,7 @@
         </p:nvSpPr>
         <p:spPr>
           <a:xfrm>
-            <a:off x="3574010" y="2920532"/>
+            <a:off x="3269210" y="3365689"/>
             <a:ext cx="236048" cy="173380"/>
           </a:xfrm>
           <a:prstGeom prst="flowChartDecision">
@@ -4266,7 +4266,7 @@
         </p:nvSpPr>
         <p:spPr>
           <a:xfrm>
-            <a:off x="6054450" y="3352800"/>
+            <a:off x="5749650" y="3797957"/>
             <a:ext cx="708186" cy="346760"/>
           </a:xfrm>
           <a:prstGeom prst="rect">
@@ -4322,7 +4322,7 @@
         </p:nvSpPr>
         <p:spPr>
           <a:xfrm>
-            <a:off x="5581947" y="3436410"/>
+            <a:off x="5277147" y="3881567"/>
             <a:ext cx="236048" cy="173380"/>
           </a:xfrm>
           <a:prstGeom prst="flowChartDecision">
@@ -4371,7 +4371,7 @@
         </p:nvCxnSpPr>
         <p:spPr>
           <a:xfrm>
-            <a:off x="5817995" y="3523100"/>
+            <a:off x="5513195" y="3968257"/>
             <a:ext cx="236455" cy="3080"/>
           </a:xfrm>
           <a:prstGeom prst="bentConnector3">
@@ -4409,7 +4409,7 @@
         </p:nvSpPr>
         <p:spPr>
           <a:xfrm>
-            <a:off x="7452183" y="3061482"/>
+            <a:off x="7147383" y="3506639"/>
             <a:ext cx="853615" cy="285783"/>
           </a:xfrm>
           <a:prstGeom prst="rect">
@@ -4465,7 +4465,7 @@
         </p:nvSpPr>
         <p:spPr>
           <a:xfrm>
-            <a:off x="6781734" y="3445445"/>
+            <a:off x="6476934" y="3890602"/>
             <a:ext cx="236048" cy="173380"/>
           </a:xfrm>
           <a:prstGeom prst="flowChartDecision">
@@ -4514,7 +4514,7 @@
         </p:nvCxnSpPr>
         <p:spPr>
           <a:xfrm flipV="1">
-            <a:off x="7017782" y="3204065"/>
+            <a:off x="6712982" y="3649222"/>
             <a:ext cx="434402" cy="327761"/>
           </a:xfrm>
           <a:prstGeom prst="bentConnector3">
@@ -4552,7 +4552,7 @@
         </p:nvSpPr>
         <p:spPr>
           <a:xfrm>
-            <a:off x="7452183" y="3384460"/>
+            <a:off x="7147383" y="3829617"/>
             <a:ext cx="853615" cy="285783"/>
           </a:xfrm>
           <a:prstGeom prst="rect">
@@ -4612,7 +4612,7 @@
         </p:nvCxnSpPr>
         <p:spPr>
           <a:xfrm flipV="1">
-            <a:off x="7017782" y="3527352"/>
+            <a:off x="6712982" y="3972509"/>
             <a:ext cx="434401" cy="4783"/>
           </a:xfrm>
           <a:prstGeom prst="bentConnector3">
@@ -4650,7 +4650,7 @@
         </p:nvSpPr>
         <p:spPr>
           <a:xfrm>
-            <a:off x="7452184" y="3707438"/>
+            <a:off x="7147384" y="4152595"/>
             <a:ext cx="853616" cy="285783"/>
           </a:xfrm>
           <a:prstGeom prst="rect">
@@ -4710,7 +4710,7 @@
         </p:nvCxnSpPr>
         <p:spPr>
           <a:xfrm>
-            <a:off x="7017782" y="3532135"/>
+            <a:off x="6712982" y="3977292"/>
             <a:ext cx="434402" cy="318195"/>
           </a:xfrm>
           <a:prstGeom prst="bentConnector3">
@@ -4748,7 +4748,7 @@
         </p:nvSpPr>
         <p:spPr>
           <a:xfrm>
-            <a:off x="7452183" y="4030415"/>
+            <a:off x="7147383" y="4475572"/>
             <a:ext cx="853617" cy="285783"/>
           </a:xfrm>
           <a:prstGeom prst="rect">
@@ -4808,7 +4808,7 @@
         </p:nvCxnSpPr>
         <p:spPr>
           <a:xfrm>
-            <a:off x="7017782" y="3532135"/>
+            <a:off x="6712982" y="3977292"/>
             <a:ext cx="434401" cy="641172"/>
           </a:xfrm>
           <a:prstGeom prst="bentConnector3">
@@ -4850,7 +4850,7 @@
         </p:nvCxnSpPr>
         <p:spPr>
           <a:xfrm rot="5400000">
-            <a:off x="2548365" y="2340499"/>
+            <a:off x="2243565" y="2785656"/>
             <a:ext cx="776896" cy="234430"/>
           </a:xfrm>
           <a:prstGeom prst="bentConnector3">
@@ -4891,7 +4891,7 @@
         </p:nvSpPr>
         <p:spPr>
           <a:xfrm rot="10800000" flipV="1">
-            <a:off x="2912835" y="1912204"/>
+            <a:off x="2608035" y="2357361"/>
             <a:ext cx="282387" cy="157062"/>
           </a:xfrm>
           <a:prstGeom prst="triangle">
@@ -4939,7 +4939,7 @@
         </p:nvSpPr>
         <p:spPr>
           <a:xfrm>
-            <a:off x="569736" y="1524000"/>
+            <a:off x="264936" y="1969157"/>
             <a:ext cx="1485383" cy="364396"/>
           </a:xfrm>
           <a:prstGeom prst="rect">
@@ -5010,8 +5010,8 @@
         </p:nvSpPr>
         <p:spPr>
           <a:xfrm rot="16200000">
-            <a:off x="5887567" y="4073829"/>
-            <a:ext cx="877256" cy="261610"/>
+            <a:off x="5611468" y="4495245"/>
+            <a:ext cx="881018" cy="261610"/>
           </a:xfrm>
           <a:prstGeom prst="rect">
             <a:avLst/>
@@ -5049,7 +5049,7 @@
         </p:nvSpPr>
         <p:spPr>
           <a:xfrm>
-            <a:off x="1290555" y="4572000"/>
+            <a:off x="985755" y="5017157"/>
             <a:ext cx="1066800" cy="346760"/>
           </a:xfrm>
           <a:prstGeom prst="rect">
@@ -5123,7 +5123,7 @@
         </p:nvCxnSpPr>
         <p:spPr>
           <a:xfrm rot="16200000" flipH="1">
-            <a:off x="439316" y="3894141"/>
+            <a:off x="134516" y="4339298"/>
             <a:ext cx="1163980" cy="538497"/>
           </a:xfrm>
           <a:prstGeom prst="bentConnector2">
@@ -5162,7 +5162,7 @@
         </p:nvSpPr>
         <p:spPr>
           <a:xfrm>
-            <a:off x="3985601" y="3321496"/>
+            <a:off x="3680801" y="3766653"/>
             <a:ext cx="189257" cy="178683"/>
           </a:xfrm>
           <a:prstGeom prst="rect">
@@ -5201,7 +5201,7 @@
         </p:nvSpPr>
         <p:spPr>
           <a:xfrm>
-            <a:off x="5814502" y="3565919"/>
+            <a:off x="5510044" y="4035413"/>
             <a:ext cx="189257" cy="178683"/>
           </a:xfrm>
           <a:prstGeom prst="rect">
@@ -5240,7 +5240,7 @@
         </p:nvSpPr>
         <p:spPr>
           <a:xfrm>
-            <a:off x="1822432" y="2756715"/>
+            <a:off x="1620359" y="3244545"/>
             <a:ext cx="170110" cy="137542"/>
           </a:xfrm>
           <a:prstGeom prst="rect">
@@ -5279,7 +5279,7 @@
         </p:nvSpPr>
         <p:spPr>
           <a:xfrm>
-            <a:off x="1956108" y="3667737"/>
+            <a:off x="1651308" y="4112894"/>
             <a:ext cx="189257" cy="178683"/>
           </a:xfrm>
           <a:prstGeom prst="rect">
@@ -5318,7 +5318,7 @@
         </p:nvSpPr>
         <p:spPr>
           <a:xfrm>
-            <a:off x="6034939" y="3718408"/>
+            <a:off x="5646412" y="4194179"/>
             <a:ext cx="189257" cy="178683"/>
           </a:xfrm>
           <a:prstGeom prst="rect">
@@ -5363,7 +5363,7 @@
         </p:nvSpPr>
         <p:spPr>
           <a:xfrm>
-            <a:off x="7452183" y="2726061"/>
+            <a:off x="7147383" y="3171218"/>
             <a:ext cx="853615" cy="285783"/>
           </a:xfrm>
           <a:prstGeom prst="rect">
@@ -5429,7 +5429,7 @@
         </p:nvCxnSpPr>
         <p:spPr>
           <a:xfrm flipV="1">
-            <a:off x="7017782" y="2868953"/>
+            <a:off x="6712982" y="3314110"/>
             <a:ext cx="434401" cy="663182"/>
           </a:xfrm>
           <a:prstGeom prst="bentConnector3">
@@ -5475,7 +5475,7 @@
         </p:nvSpPr>
         <p:spPr>
           <a:xfrm>
-            <a:off x="7206030" y="2752955"/>
+            <a:off x="6916010" y="3358848"/>
             <a:ext cx="189257" cy="178683"/>
           </a:xfrm>
           <a:prstGeom prst="rect">
@@ -5514,7 +5514,7 @@
         </p:nvSpPr>
         <p:spPr>
           <a:xfrm>
-            <a:off x="2520717" y="1524000"/>
+            <a:off x="2215917" y="1969157"/>
             <a:ext cx="1060683" cy="364396"/>
           </a:xfrm>
           <a:prstGeom prst="rect">
@@ -5570,7 +5570,7 @@
         </p:nvSpPr>
         <p:spPr>
           <a:xfrm rot="16200000">
-            <a:off x="2019609" y="1594808"/>
+            <a:off x="1714809" y="2039965"/>
             <a:ext cx="271014" cy="187417"/>
           </a:xfrm>
           <a:prstGeom prst="triangle">
@@ -5625,7 +5625,7 @@
         </p:nvCxnSpPr>
         <p:spPr>
           <a:xfrm>
-            <a:off x="2248825" y="1703377"/>
+            <a:off x="1944025" y="2148534"/>
             <a:ext cx="271892" cy="2821"/>
           </a:xfrm>
           <a:prstGeom prst="bentConnector3">
@@ -5676,7 +5676,7 @@
         </p:nvCxnSpPr>
         <p:spPr>
           <a:xfrm>
-            <a:off x="3810058" y="3007222"/>
+            <a:off x="3505258" y="3452379"/>
             <a:ext cx="385250" cy="519649"/>
           </a:xfrm>
           <a:prstGeom prst="bentConnector3">
@@ -5722,7 +5722,7 @@
         </p:nvSpPr>
         <p:spPr>
           <a:xfrm>
-            <a:off x="4192476" y="2476513"/>
+            <a:off x="3887676" y="2921670"/>
             <a:ext cx="1376580" cy="346760"/>
           </a:xfrm>
           <a:prstGeom prst="rect">
@@ -5788,7 +5788,7 @@
         </p:nvCxnSpPr>
         <p:spPr>
           <a:xfrm flipV="1">
-            <a:off x="3810058" y="2649893"/>
+            <a:off x="3505258" y="3095050"/>
             <a:ext cx="382418" cy="357329"/>
           </a:xfrm>
           <a:prstGeom prst="bentConnector3">
@@ -5834,7 +5834,7 @@
         </p:nvSpPr>
         <p:spPr>
           <a:xfrm>
-            <a:off x="6052815" y="2474578"/>
+            <a:off x="5748015" y="2919735"/>
             <a:ext cx="965074" cy="346760"/>
           </a:xfrm>
           <a:prstGeom prst="rect">
@@ -5896,7 +5896,7 @@
         </p:nvSpPr>
         <p:spPr>
           <a:xfrm>
-            <a:off x="5589580" y="2561268"/>
+            <a:off x="5284780" y="3006425"/>
             <a:ext cx="236048" cy="173380"/>
           </a:xfrm>
           <a:prstGeom prst="flowChartDecision">
@@ -5949,7 +5949,7 @@
         </p:nvCxnSpPr>
         <p:spPr>
           <a:xfrm>
-            <a:off x="5825628" y="2647958"/>
+            <a:off x="5520828" y="3093115"/>
             <a:ext cx="218878" cy="3080"/>
           </a:xfrm>
           <a:prstGeom prst="bentConnector3">
@@ -5993,7 +5993,7 @@
         </p:nvSpPr>
         <p:spPr>
           <a:xfrm>
-            <a:off x="5825628" y="2715489"/>
+            <a:off x="5520828" y="3160646"/>
             <a:ext cx="189257" cy="178683"/>
           </a:xfrm>
           <a:prstGeom prst="rect">
@@ -6038,7 +6038,7 @@
         </p:nvSpPr>
         <p:spPr>
           <a:xfrm>
-            <a:off x="4180710" y="1577311"/>
+            <a:off x="3877590" y="2070030"/>
             <a:ext cx="1408870" cy="346760"/>
           </a:xfrm>
           <a:prstGeom prst="rect">
@@ -6104,7 +6104,7 @@
         </p:nvCxnSpPr>
         <p:spPr>
           <a:xfrm rot="5400000">
-            <a:off x="5564698" y="2382837"/>
+            <a:off x="5259898" y="2827994"/>
             <a:ext cx="286722" cy="1654586"/>
           </a:xfrm>
           <a:prstGeom prst="bentConnector3">
@@ -6150,7 +6150,7 @@
         </p:nvSpPr>
         <p:spPr>
           <a:xfrm>
-            <a:off x="4714423" y="3084310"/>
+            <a:off x="4409623" y="3529467"/>
             <a:ext cx="189257" cy="178683"/>
           </a:xfrm>
           <a:prstGeom prst="rect">
@@ -6195,7 +6195,7 @@
         </p:nvSpPr>
         <p:spPr>
           <a:xfrm>
-            <a:off x="3958416" y="2442739"/>
+            <a:off x="3653616" y="2887896"/>
             <a:ext cx="189257" cy="178683"/>
           </a:xfrm>
           <a:prstGeom prst="rect">
@@ -6240,7 +6240,7 @@
         </p:nvSpPr>
         <p:spPr>
           <a:xfrm rot="5400000">
-            <a:off x="6417328" y="2862055"/>
+            <a:off x="6112528" y="3307212"/>
             <a:ext cx="236048" cy="173380"/>
           </a:xfrm>
           <a:prstGeom prst="flowChartDecision">
@@ -6291,7 +6291,7 @@
         </p:nvSpPr>
         <p:spPr>
           <a:xfrm rot="5400000">
-            <a:off x="6407287" y="2260371"/>
+            <a:off x="6102487" y="2705528"/>
             <a:ext cx="236048" cy="173380"/>
           </a:xfrm>
           <a:prstGeom prst="flowChartDecision">
@@ -6346,12 +6346,12 @@
         </p:nvCxnSpPr>
         <p:spPr>
           <a:xfrm rot="16200000" flipV="1">
-            <a:off x="5552745" y="1256471"/>
-            <a:ext cx="304966" cy="1640166"/>
+            <a:off x="5272566" y="1726249"/>
+            <a:ext cx="257404" cy="1638486"/>
           </a:xfrm>
           <a:prstGeom prst="bentConnector3">
             <a:avLst>
-              <a:gd name="adj1" fmla="val 26013"/>
+              <a:gd name="adj1" fmla="val 23357"/>
             </a:avLst>
           </a:prstGeom>
           <a:ln w="19050">
@@ -6392,7 +6392,7 @@
         </p:nvSpPr>
         <p:spPr>
           <a:xfrm>
-            <a:off x="4677664" y="1981707"/>
+            <a:off x="4361101" y="2442831"/>
             <a:ext cx="189257" cy="178683"/>
           </a:xfrm>
           <a:prstGeom prst="rect">
@@ -6437,7 +6437,7 @@
         </p:nvSpPr>
         <p:spPr>
           <a:xfrm>
-            <a:off x="6054450" y="1572564"/>
+            <a:off x="5749650" y="2072187"/>
             <a:ext cx="879750" cy="346760"/>
           </a:xfrm>
           <a:prstGeom prst="rect">
@@ -6499,7 +6499,7 @@
         </p:nvSpPr>
         <p:spPr>
           <a:xfrm>
-            <a:off x="5607804" y="1659254"/>
+            <a:off x="5304081" y="2158877"/>
             <a:ext cx="236048" cy="173380"/>
           </a:xfrm>
           <a:prstGeom prst="flowChartDecision">
@@ -6532,56 +6532,10 @@
           <a:lstStyle/>
           <a:p>
             <a:pPr algn="ctr"/>
-            <a:endParaRPr lang="en-US" sz="1050"/>
-          </a:p>
-        </p:txBody>
-      </p:sp>
-      <p:cxnSp>
-        <p:nvCxnSpPr>
-          <p:cNvPr id="113" name="Elbow Connector 63">
-            <a:extLst>
-              <a:ext uri="{FF2B5EF4-FFF2-40B4-BE49-F238E27FC236}">
-                <a16:creationId xmlns:a16="http://schemas.microsoft.com/office/drawing/2014/main" id="{B3FBBF41-16CA-44C0-83E3-A9C28EC4401D}"/>
-              </a:ext>
-            </a:extLst>
-          </p:cNvPr>
-          <p:cNvCxnSpPr>
-            <a:stCxn id="112" idx="3"/>
-          </p:cNvCxnSpPr>
-          <p:nvPr/>
-        </p:nvCxnSpPr>
-        <p:spPr>
-          <a:xfrm>
-            <a:off x="5843852" y="1745944"/>
-            <a:ext cx="218878" cy="3080"/>
-          </a:xfrm>
-          <a:prstGeom prst="bentConnector3">
-            <a:avLst/>
-          </a:prstGeom>
-          <a:ln w="19050">
-            <a:solidFill>
-              <a:srgbClr val="7030A0"/>
-            </a:solidFill>
-            <a:headEnd type="none" w="med" len="med"/>
-            <a:tailEnd type="arrow" w="med" len="med"/>
-          </a:ln>
-          <a:effectLst/>
-        </p:spPr>
-        <p:style>
-          <a:lnRef idx="1">
-            <a:schemeClr val="accent2"/>
-          </a:lnRef>
-          <a:fillRef idx="2">
-            <a:schemeClr val="accent2"/>
-          </a:fillRef>
-          <a:effectRef idx="1">
-            <a:schemeClr val="accent2"/>
-          </a:effectRef>
-          <a:fontRef idx="minor">
-            <a:schemeClr val="dk1"/>
-          </a:fontRef>
-        </p:style>
-      </p:cxnSp>
+            <a:endParaRPr lang="en-US" sz="1050" dirty="0"/>
+          </a:p>
+        </p:txBody>
+      </p:sp>
       <p:sp>
         <p:nvSpPr>
           <p:cNvPr id="115" name="TextBox 114">
@@ -6596,7 +6550,7 @@
         </p:nvSpPr>
         <p:spPr>
           <a:xfrm>
-            <a:off x="5843852" y="1813475"/>
+            <a:off x="5539052" y="2313098"/>
             <a:ext cx="189257" cy="178683"/>
           </a:xfrm>
           <a:prstGeom prst="rect">
@@ -6641,7 +6595,7 @@
         </p:nvSpPr>
         <p:spPr>
           <a:xfrm>
-            <a:off x="7447101" y="1412252"/>
+            <a:off x="7142301" y="1911875"/>
             <a:ext cx="853615" cy="285783"/>
           </a:xfrm>
           <a:prstGeom prst="rect">
@@ -6703,7 +6657,7 @@
         </p:nvSpPr>
         <p:spPr>
           <a:xfrm>
-            <a:off x="7447102" y="1847817"/>
+            <a:off x="7142302" y="2347440"/>
             <a:ext cx="853615" cy="285783"/>
           </a:xfrm>
           <a:prstGeom prst="rect">
@@ -6769,7 +6723,7 @@
         </p:nvCxnSpPr>
         <p:spPr>
           <a:xfrm>
-            <a:off x="7184649" y="1763781"/>
+            <a:off x="6879849" y="2263404"/>
             <a:ext cx="262453" cy="226928"/>
           </a:xfrm>
           <a:prstGeom prst="bentConnector3">
@@ -6815,7 +6769,7 @@
         </p:nvSpPr>
         <p:spPr>
           <a:xfrm>
-            <a:off x="6948601" y="1677091"/>
+            <a:off x="6643801" y="2176714"/>
             <a:ext cx="236048" cy="173380"/>
           </a:xfrm>
           <a:prstGeom prst="flowChartDecision">
@@ -6872,7 +6826,7 @@
         </p:nvCxnSpPr>
         <p:spPr>
           <a:xfrm flipV="1">
-            <a:off x="7184649" y="1555144"/>
+            <a:off x="6879849" y="2054767"/>
             <a:ext cx="262452" cy="208637"/>
           </a:xfrm>
           <a:prstGeom prst="bentConnector3">
@@ -6921,7 +6875,7 @@
         </p:nvCxnSpPr>
         <p:spPr>
           <a:xfrm>
-            <a:off x="3200400" y="2281400"/>
+            <a:off x="2895600" y="2726557"/>
             <a:ext cx="1680366" cy="195113"/>
           </a:xfrm>
           <a:prstGeom prst="bentConnector2">
@@ -6969,7 +6923,7 @@
         </p:nvCxnSpPr>
         <p:spPr>
           <a:xfrm rot="5400000" flipH="1" flipV="1">
-            <a:off x="1918533" y="1823247"/>
+            <a:off x="1613733" y="2268404"/>
             <a:ext cx="439936" cy="1362197"/>
           </a:xfrm>
           <a:prstGeom prst="bentConnector2">
@@ -7012,7 +6966,7 @@
         </p:nvCxnSpPr>
         <p:spPr>
           <a:xfrm flipV="1">
-            <a:off x="2795733" y="2221327"/>
+            <a:off x="2490933" y="2666484"/>
             <a:ext cx="252267" cy="63162"/>
           </a:xfrm>
           <a:prstGeom prst="bentConnector3">
@@ -7057,7 +7011,7 @@
         </p:nvCxnSpPr>
         <p:spPr>
           <a:xfrm>
-            <a:off x="2999744" y="2221326"/>
+            <a:off x="2694944" y="2666483"/>
             <a:ext cx="200656" cy="61903"/>
           </a:xfrm>
           <a:prstGeom prst="bentConnector3">
@@ -7100,7 +7054,7 @@
         </p:nvSpPr>
         <p:spPr>
           <a:xfrm>
-            <a:off x="4677663" y="2283228"/>
+            <a:off x="4372863" y="2728385"/>
             <a:ext cx="189257" cy="178683"/>
           </a:xfrm>
           <a:prstGeom prst="rect">
@@ -7145,7 +7099,7 @@
         </p:nvSpPr>
         <p:spPr>
           <a:xfrm>
-            <a:off x="4648200" y="2231409"/>
+            <a:off x="4343400" y="2676566"/>
             <a:ext cx="1024491" cy="261610"/>
           </a:xfrm>
           <a:prstGeom prst="rect">
@@ -7181,7 +7135,7 @@
           <p:cNvPr id="94" name="Rectangle 8">
             <a:extLst>
               <a:ext uri="{FF2B5EF4-FFF2-40B4-BE49-F238E27FC236}">
-                <a16:creationId xmlns:a16="http://schemas.microsoft.com/office/drawing/2014/main" id="{8E30B33E-BA95-49C0-9AB6-EE0BF1F25B65}"/>
+                <a16:creationId xmlns:a16="http://schemas.microsoft.com/office/drawing/2014/main" id="{CB3EEADF-5674-4728-B89E-D6A96BF2603C}"/>
               </a:ext>
             </a:extLst>
           </p:cNvPr>
@@ -7190,8 +7144,8 @@
         </p:nvSpPr>
         <p:spPr>
           <a:xfrm>
-            <a:off x="4192476" y="4650301"/>
-            <a:ext cx="1156969" cy="285783"/>
+            <a:off x="3850643" y="1447800"/>
+            <a:ext cx="1408870" cy="346760"/>
           </a:xfrm>
           <a:prstGeom prst="rect">
             <a:avLst/>
@@ -7228,7 +7182,7 @@
                   <a:srgbClr val="7030A0"/>
                 </a:solidFill>
               </a:rPr>
-              <a:t>UniqueTagList</a:t>
+              <a:t>UniqueSessionList</a:t>
             </a:r>
             <a:endParaRPr lang="en-SG" sz="1050" dirty="0">
               <a:solidFill>
@@ -7240,10 +7194,10 @@
       </p:sp>
       <p:sp>
         <p:nvSpPr>
-          <p:cNvPr id="98" name="Rectangle 8">
+          <p:cNvPr id="96" name="Rectangle 8">
             <a:extLst>
               <a:ext uri="{FF2B5EF4-FFF2-40B4-BE49-F238E27FC236}">
-                <a16:creationId xmlns:a16="http://schemas.microsoft.com/office/drawing/2014/main" id="{B24575CB-3007-4B6E-920F-F6F94B195233}"/>
+                <a16:creationId xmlns:a16="http://schemas.microsoft.com/office/drawing/2014/main" id="{66DC3034-D82E-4D85-83D3-C54D41062B33}"/>
               </a:ext>
             </a:extLst>
           </p:cNvPr>
@@ -7252,8 +7206,8 @@
         </p:nvSpPr>
         <p:spPr>
           <a:xfrm>
-            <a:off x="6120117" y="4612399"/>
-            <a:ext cx="708186" cy="346760"/>
+            <a:off x="5748185" y="1447800"/>
+            <a:ext cx="879750" cy="346760"/>
           </a:xfrm>
           <a:prstGeom prst="rect">
             <a:avLst/>
@@ -7290,7 +7244,7 @@
                   <a:srgbClr val="7030A0"/>
                 </a:solidFill>
               </a:rPr>
-              <a:t>Tag</a:t>
+              <a:t>Session</a:t>
             </a:r>
             <a:endParaRPr lang="en-SG" sz="1050" dirty="0">
               <a:solidFill>
@@ -7302,55 +7256,10 @@
       </p:sp>
       <p:sp>
         <p:nvSpPr>
-          <p:cNvPr id="101" name="TextBox 100">
+          <p:cNvPr id="98" name="Flowchart: Decision 96">
             <a:extLst>
               <a:ext uri="{FF2B5EF4-FFF2-40B4-BE49-F238E27FC236}">
-                <a16:creationId xmlns:a16="http://schemas.microsoft.com/office/drawing/2014/main" id="{D3F23399-0E69-4613-8F65-46E2F230D4A1}"/>
-              </a:ext>
-            </a:extLst>
-          </p:cNvPr>
-          <p:cNvSpPr txBox="1"/>
-          <p:nvPr/>
-        </p:nvSpPr>
-        <p:spPr>
-          <a:xfrm>
-            <a:off x="6099581" y="5386199"/>
-            <a:ext cx="189257" cy="178683"/>
-          </a:xfrm>
-          <a:prstGeom prst="rect">
-            <a:avLst/>
-          </a:prstGeom>
-          <a:noFill/>
-        </p:spPr>
-        <p:txBody>
-          <a:bodyPr wrap="square" lIns="0" tIns="0" rIns="0" bIns="0" rtlCol="0">
-            <a:noAutofit/>
-          </a:bodyPr>
-          <a:lstStyle/>
-          <a:p>
-            <a:pPr algn="ctr"/>
-            <a:r>
-              <a:rPr lang="en-US" sz="1100" dirty="0">
-                <a:solidFill>
-                  <a:srgbClr val="7030A0"/>
-                </a:solidFill>
-              </a:rPr>
-              <a:t>*</a:t>
-            </a:r>
-            <a:endParaRPr lang="en-SG" sz="1100" dirty="0">
-              <a:solidFill>
-                <a:srgbClr val="7030A0"/>
-              </a:solidFill>
-            </a:endParaRPr>
-          </a:p>
-        </p:txBody>
-      </p:sp>
-      <p:sp>
-        <p:nvSpPr>
-          <p:cNvPr id="102" name="Flowchart: Decision 96">
-            <a:extLst>
-              <a:ext uri="{FF2B5EF4-FFF2-40B4-BE49-F238E27FC236}">
-                <a16:creationId xmlns:a16="http://schemas.microsoft.com/office/drawing/2014/main" id="{0478923D-C971-426B-9DBA-52647ABA43DB}"/>
+                <a16:creationId xmlns:a16="http://schemas.microsoft.com/office/drawing/2014/main" id="{FE5C7E94-4B3E-42FD-9909-7A03F20AF4D0}"/>
               </a:ext>
             </a:extLst>
           </p:cNvPr>
@@ -7359,15 +7268,13 @@
         </p:nvSpPr>
         <p:spPr>
           <a:xfrm>
-            <a:off x="5371559" y="4706502"/>
+            <a:off x="5281548" y="1529989"/>
             <a:ext cx="236048" cy="173380"/>
           </a:xfrm>
           <a:prstGeom prst="flowChartDecision">
             <a:avLst/>
           </a:prstGeom>
-          <a:solidFill>
-            <a:srgbClr val="7030A0"/>
-          </a:solidFill>
+          <a:noFill/>
           <a:ln w="19050">
             <a:solidFill>
               <a:srgbClr val="7030A0"/>
@@ -7398,29 +7305,138 @@
           </a:p>
         </p:txBody>
       </p:sp>
+      <p:sp>
+        <p:nvSpPr>
+          <p:cNvPr id="102" name="TextBox 101">
+            <a:extLst>
+              <a:ext uri="{FF2B5EF4-FFF2-40B4-BE49-F238E27FC236}">
+                <a16:creationId xmlns:a16="http://schemas.microsoft.com/office/drawing/2014/main" id="{EB7188F6-B7F2-4C93-B94D-41E964A65931}"/>
+              </a:ext>
+            </a:extLst>
+          </p:cNvPr>
+          <p:cNvSpPr txBox="1"/>
+          <p:nvPr/>
+        </p:nvSpPr>
+        <p:spPr>
+          <a:xfrm>
+            <a:off x="5536893" y="1672930"/>
+            <a:ext cx="189257" cy="178683"/>
+          </a:xfrm>
+          <a:prstGeom prst="rect">
+            <a:avLst/>
+          </a:prstGeom>
+          <a:noFill/>
+        </p:spPr>
+        <p:txBody>
+          <a:bodyPr wrap="square" lIns="0" tIns="0" rIns="0" bIns="0" rtlCol="0">
+            <a:noAutofit/>
+          </a:bodyPr>
+          <a:lstStyle/>
+          <a:p>
+            <a:pPr algn="ctr"/>
+            <a:r>
+              <a:rPr lang="en-US" sz="1100" dirty="0">
+                <a:solidFill>
+                  <a:srgbClr val="7030A0"/>
+                </a:solidFill>
+              </a:rPr>
+              <a:t>*</a:t>
+            </a:r>
+            <a:endParaRPr lang="en-SG" sz="1100" dirty="0">
+              <a:solidFill>
+                <a:srgbClr val="7030A0"/>
+              </a:solidFill>
+            </a:endParaRPr>
+          </a:p>
+        </p:txBody>
+      </p:sp>
+      <p:sp>
+        <p:nvSpPr>
+          <p:cNvPr id="104" name="Rectangle 8">
+            <a:extLst>
+              <a:ext uri="{FF2B5EF4-FFF2-40B4-BE49-F238E27FC236}">
+                <a16:creationId xmlns:a16="http://schemas.microsoft.com/office/drawing/2014/main" id="{CAD6C7E3-6154-468D-9405-77032F889A74}"/>
+              </a:ext>
+            </a:extLst>
+          </p:cNvPr>
+          <p:cNvSpPr/>
+          <p:nvPr/>
+        </p:nvSpPr>
+        <p:spPr>
+          <a:xfrm>
+            <a:off x="7134669" y="1480403"/>
+            <a:ext cx="853615" cy="285783"/>
+          </a:xfrm>
+          <a:prstGeom prst="rect">
+            <a:avLst/>
+          </a:prstGeom>
+          <a:ln w="19050">
+            <a:solidFill>
+              <a:srgbClr val="7030A0"/>
+            </a:solidFill>
+          </a:ln>
+          <a:effectLst/>
+        </p:spPr>
+        <p:style>
+          <a:lnRef idx="1">
+            <a:schemeClr val="accent4"/>
+          </a:lnRef>
+          <a:fillRef idx="2">
+            <a:schemeClr val="accent4"/>
+          </a:fillRef>
+          <a:effectRef idx="1">
+            <a:schemeClr val="accent4"/>
+          </a:effectRef>
+          <a:fontRef idx="minor">
+            <a:schemeClr val="dk1"/>
+          </a:fontRef>
+        </p:style>
+        <p:txBody>
+          <a:bodyPr rtlCol="0" anchor="ctr"/>
+          <a:lstStyle/>
+          <a:p>
+            <a:pPr algn="ctr"/>
+            <a:r>
+              <a:rPr lang="en-US" sz="1050" dirty="0">
+                <a:solidFill>
+                  <a:srgbClr val="7030A0"/>
+                </a:solidFill>
+              </a:rPr>
+              <a:t>Attendance</a:t>
+            </a:r>
+            <a:endParaRPr lang="en-SG" sz="1050" dirty="0">
+              <a:solidFill>
+                <a:srgbClr val="7030A0"/>
+              </a:solidFill>
+            </a:endParaRPr>
+          </a:p>
+        </p:txBody>
+      </p:sp>
       <p:cxnSp>
         <p:nvCxnSpPr>
-          <p:cNvPr id="103" name="Straight Arrow Connector 102">
+          <p:cNvPr id="108" name="Elbow Connector 78">
             <a:extLst>
               <a:ext uri="{FF2B5EF4-FFF2-40B4-BE49-F238E27FC236}">
-                <a16:creationId xmlns:a16="http://schemas.microsoft.com/office/drawing/2014/main" id="{3C3BC64C-8EDD-4342-8531-401BF050C4A6}"/>
+                <a16:creationId xmlns:a16="http://schemas.microsoft.com/office/drawing/2014/main" id="{DAA26F13-F365-4E95-AA5A-A064852FD2FE}"/>
               </a:ext>
             </a:extLst>
           </p:cNvPr>
           <p:cNvCxnSpPr>
             <a:cxnSpLocks/>
-            <a:stCxn id="102" idx="3"/>
-            <a:endCxn id="98" idx="1"/>
+            <a:stCxn id="109" idx="3"/>
+            <a:endCxn id="104" idx="1"/>
           </p:cNvCxnSpPr>
           <p:nvPr/>
         </p:nvCxnSpPr>
         <p:spPr>
-          <a:xfrm flipV="1">
-            <a:off x="5607607" y="4785779"/>
-            <a:ext cx="512510" cy="7413"/>
-          </a:xfrm>
-          <a:prstGeom prst="straightConnector1">
-            <a:avLst/>
+          <a:xfrm>
+            <a:off x="6877690" y="1623236"/>
+            <a:ext cx="256979" cy="59"/>
+          </a:xfrm>
+          <a:prstGeom prst="bentConnector3">
+            <a:avLst>
+              <a:gd name="adj1" fmla="val 50000"/>
+            </a:avLst>
           </a:prstGeom>
           <a:ln w="19050">
             <a:solidFill>
@@ -7446,59 +7462,12 @@
           </a:fontRef>
         </p:style>
       </p:cxnSp>
-      <p:cxnSp>
-        <p:nvCxnSpPr>
-          <p:cNvPr id="104" name="Elbow Connector 78">
-            <a:extLst>
-              <a:ext uri="{FF2B5EF4-FFF2-40B4-BE49-F238E27FC236}">
-                <a16:creationId xmlns:a16="http://schemas.microsoft.com/office/drawing/2014/main" id="{A3BD7949-66F0-4E6E-94DC-4549BF5A0608}"/>
-              </a:ext>
-            </a:extLst>
-          </p:cNvPr>
-          <p:cNvCxnSpPr>
-            <a:cxnSpLocks/>
-            <a:endCxn id="94" idx="1"/>
-          </p:cNvCxnSpPr>
-          <p:nvPr/>
-        </p:nvCxnSpPr>
-        <p:spPr>
-          <a:xfrm rot="16200000" flipH="1">
-            <a:off x="3883591" y="4484308"/>
-            <a:ext cx="426560" cy="191209"/>
-          </a:xfrm>
-          <a:prstGeom prst="bentConnector2">
-            <a:avLst/>
-          </a:prstGeom>
-          <a:ln w="19050">
-            <a:solidFill>
-              <a:srgbClr val="7030A0"/>
-            </a:solidFill>
-            <a:headEnd type="none" w="med" len="med"/>
-            <a:tailEnd type="arrow" w="med" len="med"/>
-          </a:ln>
-          <a:effectLst/>
-        </p:spPr>
-        <p:style>
-          <a:lnRef idx="1">
-            <a:schemeClr val="accent2"/>
-          </a:lnRef>
-          <a:fillRef idx="2">
-            <a:schemeClr val="accent2"/>
-          </a:fillRef>
-          <a:effectRef idx="1">
-            <a:schemeClr val="accent2"/>
-          </a:effectRef>
-          <a:fontRef idx="minor">
-            <a:schemeClr val="dk1"/>
-          </a:fontRef>
-        </p:style>
-      </p:cxnSp>
       <p:sp>
         <p:nvSpPr>
           <p:cNvPr id="109" name="Flowchart: Decision 96">
             <a:extLst>
               <a:ext uri="{FF2B5EF4-FFF2-40B4-BE49-F238E27FC236}">
-                <a16:creationId xmlns:a16="http://schemas.microsoft.com/office/drawing/2014/main" id="{9F69E840-62D9-4D12-827D-8D7BD586C411}"/>
+                <a16:creationId xmlns:a16="http://schemas.microsoft.com/office/drawing/2014/main" id="{075310A9-0D17-4B6D-BF73-2D5DDF743FCE}"/>
               </a:ext>
             </a:extLst>
           </p:cNvPr>
@@ -7506,14 +7475,16 @@
           <p:nvPr/>
         </p:nvSpPr>
         <p:spPr>
-          <a:xfrm rot="5400000">
-            <a:off x="6483147" y="3749742"/>
+          <a:xfrm>
+            <a:off x="6641642" y="1536546"/>
             <a:ext cx="236048" cy="173380"/>
           </a:xfrm>
           <a:prstGeom prst="flowChartDecision">
             <a:avLst/>
           </a:prstGeom>
-          <a:noFill/>
+          <a:solidFill>
+            <a:srgbClr val="7030A0"/>
+          </a:solidFill>
           <a:ln w="19050">
             <a:solidFill>
               <a:srgbClr val="7030A0"/>
@@ -7544,27 +7515,141 @@
           </a:p>
         </p:txBody>
       </p:sp>
+      <p:sp>
+        <p:nvSpPr>
+          <p:cNvPr id="118" name="Rectangle 8">
+            <a:extLst>
+              <a:ext uri="{FF2B5EF4-FFF2-40B4-BE49-F238E27FC236}">
+                <a16:creationId xmlns:a16="http://schemas.microsoft.com/office/drawing/2014/main" id="{6EAC96E8-8A5F-4F9D-8CAC-151F7F86A08F}"/>
+              </a:ext>
+            </a:extLst>
+          </p:cNvPr>
+          <p:cNvSpPr/>
+          <p:nvPr/>
+        </p:nvSpPr>
+        <p:spPr>
+          <a:xfrm>
+            <a:off x="8470193" y="2347440"/>
+            <a:ext cx="853615" cy="285783"/>
+          </a:xfrm>
+          <a:prstGeom prst="rect">
+            <a:avLst/>
+          </a:prstGeom>
+          <a:ln w="19050">
+            <a:solidFill>
+              <a:srgbClr val="7030A0"/>
+            </a:solidFill>
+          </a:ln>
+          <a:effectLst/>
+        </p:spPr>
+        <p:style>
+          <a:lnRef idx="1">
+            <a:schemeClr val="accent4"/>
+          </a:lnRef>
+          <a:fillRef idx="2">
+            <a:schemeClr val="accent4"/>
+          </a:fillRef>
+          <a:effectRef idx="1">
+            <a:schemeClr val="accent4"/>
+          </a:effectRef>
+          <a:fontRef idx="minor">
+            <a:schemeClr val="dk1"/>
+          </a:fontRef>
+        </p:style>
+        <p:txBody>
+          <a:bodyPr rtlCol="0" anchor="ctr"/>
+          <a:lstStyle/>
+          <a:p>
+            <a:pPr algn="ctr"/>
+            <a:r>
+              <a:rPr lang="en-US" sz="1050" dirty="0" err="1">
+                <a:solidFill>
+                  <a:srgbClr val="7030A0"/>
+                </a:solidFill>
+              </a:rPr>
+              <a:t>GradeEntry</a:t>
+            </a:r>
+            <a:endParaRPr lang="en-SG" sz="1050" dirty="0">
+              <a:solidFill>
+                <a:srgbClr val="7030A0"/>
+              </a:solidFill>
+            </a:endParaRPr>
+          </a:p>
+        </p:txBody>
+      </p:sp>
+      <p:sp>
+        <p:nvSpPr>
+          <p:cNvPr id="130" name="Flowchart: Decision 96">
+            <a:extLst>
+              <a:ext uri="{FF2B5EF4-FFF2-40B4-BE49-F238E27FC236}">
+                <a16:creationId xmlns:a16="http://schemas.microsoft.com/office/drawing/2014/main" id="{0EEB84D0-F684-467E-8266-A4B61BAA9704}"/>
+              </a:ext>
+            </a:extLst>
+          </p:cNvPr>
+          <p:cNvSpPr/>
+          <p:nvPr/>
+        </p:nvSpPr>
+        <p:spPr>
+          <a:xfrm>
+            <a:off x="8006342" y="2402102"/>
+            <a:ext cx="236048" cy="173380"/>
+          </a:xfrm>
+          <a:prstGeom prst="flowChartDecision">
+            <a:avLst/>
+          </a:prstGeom>
+          <a:noFill/>
+          <a:ln w="19050">
+            <a:solidFill>
+              <a:srgbClr val="7030A0"/>
+            </a:solidFill>
+          </a:ln>
+          <a:effectLst/>
+        </p:spPr>
+        <p:style>
+          <a:lnRef idx="1">
+            <a:schemeClr val="accent6"/>
+          </a:lnRef>
+          <a:fillRef idx="2">
+            <a:schemeClr val="accent6"/>
+          </a:fillRef>
+          <a:effectRef idx="1">
+            <a:schemeClr val="accent6"/>
+          </a:effectRef>
+          <a:fontRef idx="minor">
+            <a:schemeClr val="dk1"/>
+          </a:fontRef>
+        </p:style>
+        <p:txBody>
+          <a:bodyPr rtlCol="0" anchor="ctr"/>
+          <a:lstStyle/>
+          <a:p>
+            <a:pPr algn="ctr"/>
+            <a:endParaRPr lang="en-US" sz="1050"/>
+          </a:p>
+        </p:txBody>
+      </p:sp>
       <p:cxnSp>
         <p:nvCxnSpPr>
-          <p:cNvPr id="123" name="Straight Arrow Connector 122">
+          <p:cNvPr id="131" name="Elbow Connector 63">
             <a:extLst>
               <a:ext uri="{FF2B5EF4-FFF2-40B4-BE49-F238E27FC236}">
-                <a16:creationId xmlns:a16="http://schemas.microsoft.com/office/drawing/2014/main" id="{A60ECA33-2268-4D99-9612-EB9D79DE834F}"/>
+                <a16:creationId xmlns:a16="http://schemas.microsoft.com/office/drawing/2014/main" id="{D798EE99-C031-409E-B94E-D8D6576E0D3F}"/>
               </a:ext>
             </a:extLst>
           </p:cNvPr>
           <p:cNvCxnSpPr>
             <a:cxnSpLocks/>
-            <a:stCxn id="109" idx="3"/>
+            <a:stCxn id="130" idx="3"/>
+            <a:endCxn id="118" idx="1"/>
           </p:cNvCxnSpPr>
           <p:nvPr/>
         </p:nvCxnSpPr>
         <p:spPr>
           <a:xfrm>
-            <a:off x="6601171" y="3954456"/>
-            <a:ext cx="10830" cy="656772"/>
-          </a:xfrm>
-          <a:prstGeom prst="straightConnector1">
+            <a:off x="8242390" y="2488792"/>
+            <a:ext cx="227803" cy="1540"/>
+          </a:xfrm>
+          <a:prstGeom prst="bentConnector3">
             <a:avLst/>
           </a:prstGeom>
           <a:ln w="19050">
@@ -7593,42 +7678,59 @@
       </p:cxnSp>
       <p:sp>
         <p:nvSpPr>
-          <p:cNvPr id="128" name="TextBox 127">
+          <p:cNvPr id="132" name="Rectangle 8">
             <a:extLst>
               <a:ext uri="{FF2B5EF4-FFF2-40B4-BE49-F238E27FC236}">
-                <a16:creationId xmlns:a16="http://schemas.microsoft.com/office/drawing/2014/main" id="{BECBAEDC-37FF-4D2B-9A07-36D194C6444A}"/>
+                <a16:creationId xmlns:a16="http://schemas.microsoft.com/office/drawing/2014/main" id="{E994FE71-AC9E-4140-A141-10EFC3AAA0F3}"/>
               </a:ext>
             </a:extLst>
           </p:cNvPr>
-          <p:cNvSpPr txBox="1"/>
-          <p:nvPr/>
-        </p:nvSpPr>
-        <p:spPr>
-          <a:xfrm>
-            <a:off x="6638719" y="4441151"/>
-            <a:ext cx="189257" cy="178683"/>
+          <p:cNvSpPr/>
+          <p:nvPr/>
+        </p:nvSpPr>
+        <p:spPr>
+          <a:xfrm>
+            <a:off x="8461177" y="1485871"/>
+            <a:ext cx="853615" cy="285783"/>
           </a:xfrm>
           <a:prstGeom prst="rect">
             <a:avLst/>
           </a:prstGeom>
-          <a:noFill/>
-        </p:spPr>
-        <p:txBody>
-          <a:bodyPr wrap="square" lIns="0" tIns="0" rIns="0" bIns="0" rtlCol="0">
-            <a:noAutofit/>
-          </a:bodyPr>
+          <a:ln w="19050">
+            <a:solidFill>
+              <a:srgbClr val="7030A0"/>
+            </a:solidFill>
+          </a:ln>
+          <a:effectLst/>
+        </p:spPr>
+        <p:style>
+          <a:lnRef idx="1">
+            <a:schemeClr val="accent4"/>
+          </a:lnRef>
+          <a:fillRef idx="2">
+            <a:schemeClr val="accent4"/>
+          </a:fillRef>
+          <a:effectRef idx="1">
+            <a:schemeClr val="accent4"/>
+          </a:effectRef>
+          <a:fontRef idx="minor">
+            <a:schemeClr val="dk1"/>
+          </a:fontRef>
+        </p:style>
+        <p:txBody>
+          <a:bodyPr rtlCol="0" anchor="ctr"/>
           <a:lstStyle/>
           <a:p>
             <a:pPr algn="ctr"/>
             <a:r>
-              <a:rPr lang="en-US" sz="1100" dirty="0">
+              <a:rPr lang="en-US" sz="1050" dirty="0">
                 <a:solidFill>
                   <a:srgbClr val="7030A0"/>
                 </a:solidFill>
               </a:rPr>
-              <a:t>*</a:t>
-            </a:r>
-            <a:endParaRPr lang="en-SG" sz="1100" dirty="0">
+              <a:t>Presence</a:t>
+            </a:r>
+            <a:endParaRPr lang="en-SG" sz="1050" dirty="0">
               <a:solidFill>
                 <a:srgbClr val="7030A0"/>
               </a:solidFill>
@@ -7636,32 +7738,134 @@
           </a:p>
         </p:txBody>
       </p:sp>
+      <p:sp>
+        <p:nvSpPr>
+          <p:cNvPr id="133" name="Flowchart: Decision 96">
+            <a:extLst>
+              <a:ext uri="{FF2B5EF4-FFF2-40B4-BE49-F238E27FC236}">
+                <a16:creationId xmlns:a16="http://schemas.microsoft.com/office/drawing/2014/main" id="{2E925572-F27B-43EB-8150-F276BC2F86C1}"/>
+              </a:ext>
+            </a:extLst>
+          </p:cNvPr>
+          <p:cNvSpPr/>
+          <p:nvPr/>
+        </p:nvSpPr>
+        <p:spPr>
+          <a:xfrm>
+            <a:off x="7997326" y="1540533"/>
+            <a:ext cx="236048" cy="173380"/>
+          </a:xfrm>
+          <a:prstGeom prst="flowChartDecision">
+            <a:avLst/>
+          </a:prstGeom>
+          <a:noFill/>
+          <a:ln w="19050">
+            <a:solidFill>
+              <a:srgbClr val="7030A0"/>
+            </a:solidFill>
+          </a:ln>
+          <a:effectLst/>
+        </p:spPr>
+        <p:style>
+          <a:lnRef idx="1">
+            <a:schemeClr val="accent6"/>
+          </a:lnRef>
+          <a:fillRef idx="2">
+            <a:schemeClr val="accent6"/>
+          </a:fillRef>
+          <a:effectRef idx="1">
+            <a:schemeClr val="accent6"/>
+          </a:effectRef>
+          <a:fontRef idx="minor">
+            <a:schemeClr val="dk1"/>
+          </a:fontRef>
+        </p:style>
+        <p:txBody>
+          <a:bodyPr rtlCol="0" anchor="ctr"/>
+          <a:lstStyle/>
+          <a:p>
+            <a:pPr algn="ctr"/>
+            <a:endParaRPr lang="en-US" sz="1050"/>
+          </a:p>
+        </p:txBody>
+      </p:sp>
       <p:cxnSp>
         <p:nvCxnSpPr>
-          <p:cNvPr id="129" name="Connector: Elbow 128">
+          <p:cNvPr id="134" name="Elbow Connector 63">
             <a:extLst>
               <a:ext uri="{FF2B5EF4-FFF2-40B4-BE49-F238E27FC236}">
-                <a16:creationId xmlns:a16="http://schemas.microsoft.com/office/drawing/2014/main" id="{8AAD65FE-8C14-46F0-82C1-8E8AD793BBC1}"/>
+                <a16:creationId xmlns:a16="http://schemas.microsoft.com/office/drawing/2014/main" id="{A2400F8C-4E25-4483-8BDF-B1BBD4A173A2}"/>
               </a:ext>
             </a:extLst>
           </p:cNvPr>
           <p:cNvCxnSpPr>
             <a:cxnSpLocks/>
+            <a:stCxn id="133" idx="3"/>
+            <a:endCxn id="132" idx="1"/>
           </p:cNvCxnSpPr>
           <p:nvPr/>
         </p:nvCxnSpPr>
         <p:spPr>
           <a:xfrm>
-            <a:off x="3804271" y="3003033"/>
-            <a:ext cx="196995" cy="1224000"/>
-          </a:xfrm>
-          <a:prstGeom prst="bentConnector2">
+            <a:off x="8233374" y="1627223"/>
+            <a:ext cx="227803" cy="1540"/>
+          </a:xfrm>
+          <a:prstGeom prst="bentConnector3">
             <a:avLst/>
           </a:prstGeom>
           <a:ln w="19050">
             <a:solidFill>
               <a:srgbClr val="7030A0"/>
             </a:solidFill>
+            <a:headEnd type="none" w="med" len="med"/>
+            <a:tailEnd type="arrow" w="med" len="med"/>
+          </a:ln>
+          <a:effectLst/>
+        </p:spPr>
+        <p:style>
+          <a:lnRef idx="1">
+            <a:schemeClr val="accent2"/>
+          </a:lnRef>
+          <a:fillRef idx="2">
+            <a:schemeClr val="accent2"/>
+          </a:fillRef>
+          <a:effectRef idx="1">
+            <a:schemeClr val="accent2"/>
+          </a:effectRef>
+          <a:fontRef idx="minor">
+            <a:schemeClr val="dk1"/>
+          </a:fontRef>
+        </p:style>
+      </p:cxnSp>
+      <p:cxnSp>
+        <p:nvCxnSpPr>
+          <p:cNvPr id="11" name="Straight Arrow Connector 10">
+            <a:extLst>
+              <a:ext uri="{FF2B5EF4-FFF2-40B4-BE49-F238E27FC236}">
+                <a16:creationId xmlns:a16="http://schemas.microsoft.com/office/drawing/2014/main" id="{03934545-F889-410A-92F1-ADBFF8E6EAF6}"/>
+              </a:ext>
+            </a:extLst>
+          </p:cNvPr>
+          <p:cNvCxnSpPr>
+            <a:stCxn id="112" idx="3"/>
+            <a:endCxn id="111" idx="1"/>
+          </p:cNvCxnSpPr>
+          <p:nvPr/>
+        </p:nvCxnSpPr>
+        <p:spPr>
+          <a:xfrm>
+            <a:off x="5540129" y="2245567"/>
+            <a:ext cx="209521" cy="0"/>
+          </a:xfrm>
+          <a:prstGeom prst="straightConnector1">
+            <a:avLst/>
+          </a:prstGeom>
+          <a:ln w="19050">
+            <a:solidFill>
+              <a:srgbClr val="7030A0"/>
+            </a:solidFill>
+            <a:headEnd type="none" w="med" len="med"/>
+            <a:tailEnd type="arrow" w="med" len="med"/>
           </a:ln>
         </p:spPr>
         <p:style>
@@ -7681,32 +7885,34 @@
       </p:cxnSp>
       <p:cxnSp>
         <p:nvCxnSpPr>
-          <p:cNvPr id="27" name="Connector: Elbow 26">
+          <p:cNvPr id="138" name="Straight Arrow Connector 137">
             <a:extLst>
               <a:ext uri="{FF2B5EF4-FFF2-40B4-BE49-F238E27FC236}">
-                <a16:creationId xmlns:a16="http://schemas.microsoft.com/office/drawing/2014/main" id="{1C8011AF-6A90-43E2-998F-77F134165FE8}"/>
+                <a16:creationId xmlns:a16="http://schemas.microsoft.com/office/drawing/2014/main" id="{44365DE8-00E4-4250-9951-06686DF055C0}"/>
               </a:ext>
             </a:extLst>
           </p:cNvPr>
           <p:cNvCxnSpPr>
             <a:cxnSpLocks/>
+            <a:stCxn id="98" idx="3"/>
+            <a:endCxn id="96" idx="1"/>
           </p:cNvCxnSpPr>
           <p:nvPr/>
         </p:nvCxnSpPr>
         <p:spPr>
-          <a:xfrm rot="5400000">
-            <a:off x="3885363" y="4221758"/>
-            <a:ext cx="174274" cy="57534"/>
-          </a:xfrm>
-          <a:prstGeom prst="bentConnector3">
-            <a:avLst>
-              <a:gd name="adj1" fmla="val 50000"/>
-            </a:avLst>
+          <a:xfrm>
+            <a:off x="5517596" y="1616679"/>
+            <a:ext cx="230589" cy="4501"/>
+          </a:xfrm>
+          <a:prstGeom prst="straightConnector1">
+            <a:avLst/>
           </a:prstGeom>
           <a:ln w="19050">
             <a:solidFill>
               <a:srgbClr val="7030A0"/>
             </a:solidFill>
+            <a:headEnd type="none" w="med" len="med"/>
+            <a:tailEnd type="arrow" w="med" len="med"/>
           </a:ln>
         </p:spPr>
         <p:style>
@@ -7726,10 +7932,611 @@
       </p:cxnSp>
       <p:cxnSp>
         <p:nvCxnSpPr>
-          <p:cNvPr id="130" name="Connector: Elbow 129">
+          <p:cNvPr id="139" name="Elbow Connector 78">
             <a:extLst>
               <a:ext uri="{FF2B5EF4-FFF2-40B4-BE49-F238E27FC236}">
-                <a16:creationId xmlns:a16="http://schemas.microsoft.com/office/drawing/2014/main" id="{1D95087D-52A7-42D7-9D2E-0619AF29D1FF}"/>
+                <a16:creationId xmlns:a16="http://schemas.microsoft.com/office/drawing/2014/main" id="{F300988B-4EB3-4C33-9AE5-A5792CEEFF2A}"/>
+              </a:ext>
+            </a:extLst>
+          </p:cNvPr>
+          <p:cNvCxnSpPr>
+            <a:cxnSpLocks/>
+            <a:stCxn id="105" idx="1"/>
+            <a:endCxn id="94" idx="1"/>
+          </p:cNvCxnSpPr>
+          <p:nvPr/>
+        </p:nvCxnSpPr>
+        <p:spPr>
+          <a:xfrm rot="16200000" flipV="1">
+            <a:off x="4509070" y="962753"/>
+            <a:ext cx="1053014" cy="2369868"/>
+          </a:xfrm>
+          <a:prstGeom prst="bentConnector4">
+            <a:avLst>
+              <a:gd name="adj1" fmla="val 5626"/>
+              <a:gd name="adj2" fmla="val 109646"/>
+            </a:avLst>
+          </a:prstGeom>
+          <a:ln w="19050">
+            <a:solidFill>
+              <a:srgbClr val="7030A0"/>
+            </a:solidFill>
+            <a:headEnd type="none" w="med" len="med"/>
+            <a:tailEnd type="arrow" w="med" len="med"/>
+          </a:ln>
+          <a:effectLst/>
+        </p:spPr>
+        <p:style>
+          <a:lnRef idx="1">
+            <a:schemeClr val="accent2"/>
+          </a:lnRef>
+          <a:fillRef idx="2">
+            <a:schemeClr val="accent2"/>
+          </a:fillRef>
+          <a:effectRef idx="1">
+            <a:schemeClr val="accent2"/>
+          </a:effectRef>
+          <a:fontRef idx="minor">
+            <a:schemeClr val="dk1"/>
+          </a:fontRef>
+        </p:style>
+      </p:cxnSp>
+      <p:sp>
+        <p:nvSpPr>
+          <p:cNvPr id="140" name="TextBox 139">
+            <a:extLst>
+              <a:ext uri="{FF2B5EF4-FFF2-40B4-BE49-F238E27FC236}">
+                <a16:creationId xmlns:a16="http://schemas.microsoft.com/office/drawing/2014/main" id="{4CF82132-B378-4B7E-B19E-50A99EF65EF7}"/>
+              </a:ext>
+            </a:extLst>
+          </p:cNvPr>
+          <p:cNvSpPr txBox="1"/>
+          <p:nvPr/>
+        </p:nvSpPr>
+        <p:spPr>
+          <a:xfrm>
+            <a:off x="3601838" y="1437996"/>
+            <a:ext cx="189257" cy="178683"/>
+          </a:xfrm>
+          <a:prstGeom prst="rect">
+            <a:avLst/>
+          </a:prstGeom>
+          <a:noFill/>
+        </p:spPr>
+        <p:txBody>
+          <a:bodyPr wrap="square" lIns="0" tIns="0" rIns="0" bIns="0" rtlCol="0">
+            <a:noAutofit/>
+          </a:bodyPr>
+          <a:lstStyle/>
+          <a:p>
+            <a:pPr algn="ctr"/>
+            <a:r>
+              <a:rPr lang="en-US" sz="1100" dirty="0">
+                <a:solidFill>
+                  <a:srgbClr val="7030A0"/>
+                </a:solidFill>
+              </a:rPr>
+              <a:t>1</a:t>
+            </a:r>
+            <a:endParaRPr lang="en-SG" sz="1100" dirty="0">
+              <a:solidFill>
+                <a:srgbClr val="7030A0"/>
+              </a:solidFill>
+            </a:endParaRPr>
+          </a:p>
+        </p:txBody>
+      </p:sp>
+      <p:sp>
+        <p:nvSpPr>
+          <p:cNvPr id="142" name="TextBox 141">
+            <a:extLst>
+              <a:ext uri="{FF2B5EF4-FFF2-40B4-BE49-F238E27FC236}">
+                <a16:creationId xmlns:a16="http://schemas.microsoft.com/office/drawing/2014/main" id="{0AAA6631-DBC6-4F42-812D-99F9D8052F0E}"/>
+              </a:ext>
+            </a:extLst>
+          </p:cNvPr>
+          <p:cNvSpPr txBox="1"/>
+          <p:nvPr/>
+        </p:nvSpPr>
+        <p:spPr>
+          <a:xfrm>
+            <a:off x="6936370" y="1672783"/>
+            <a:ext cx="189257" cy="178683"/>
+          </a:xfrm>
+          <a:prstGeom prst="rect">
+            <a:avLst/>
+          </a:prstGeom>
+          <a:noFill/>
+        </p:spPr>
+        <p:txBody>
+          <a:bodyPr wrap="square" lIns="0" tIns="0" rIns="0" bIns="0" rtlCol="0">
+            <a:noAutofit/>
+          </a:bodyPr>
+          <a:lstStyle/>
+          <a:p>
+            <a:pPr algn="ctr"/>
+            <a:r>
+              <a:rPr lang="en-US" sz="1100" dirty="0">
+                <a:solidFill>
+                  <a:srgbClr val="7030A0"/>
+                </a:solidFill>
+              </a:rPr>
+              <a:t>*</a:t>
+            </a:r>
+            <a:endParaRPr lang="en-SG" sz="1100" dirty="0">
+              <a:solidFill>
+                <a:srgbClr val="7030A0"/>
+              </a:solidFill>
+            </a:endParaRPr>
+          </a:p>
+        </p:txBody>
+      </p:sp>
+      <p:sp>
+        <p:nvSpPr>
+          <p:cNvPr id="143" name="TextBox 142">
+            <a:extLst>
+              <a:ext uri="{FF2B5EF4-FFF2-40B4-BE49-F238E27FC236}">
+                <a16:creationId xmlns:a16="http://schemas.microsoft.com/office/drawing/2014/main" id="{1351992F-DBBF-4F6B-84C1-35EE7132ED5D}"/>
+              </a:ext>
+            </a:extLst>
+          </p:cNvPr>
+          <p:cNvSpPr txBox="1"/>
+          <p:nvPr/>
+        </p:nvSpPr>
+        <p:spPr>
+          <a:xfrm>
+            <a:off x="8310366" y="2564517"/>
+            <a:ext cx="189257" cy="178683"/>
+          </a:xfrm>
+          <a:prstGeom prst="rect">
+            <a:avLst/>
+          </a:prstGeom>
+          <a:noFill/>
+        </p:spPr>
+        <p:txBody>
+          <a:bodyPr wrap="square" lIns="0" tIns="0" rIns="0" bIns="0" rtlCol="0">
+            <a:noAutofit/>
+          </a:bodyPr>
+          <a:lstStyle/>
+          <a:p>
+            <a:pPr algn="ctr"/>
+            <a:r>
+              <a:rPr lang="en-US" sz="1100" dirty="0">
+                <a:solidFill>
+                  <a:srgbClr val="7030A0"/>
+                </a:solidFill>
+              </a:rPr>
+              <a:t>*</a:t>
+            </a:r>
+            <a:endParaRPr lang="en-SG" sz="1100" dirty="0">
+              <a:solidFill>
+                <a:srgbClr val="7030A0"/>
+              </a:solidFill>
+            </a:endParaRPr>
+          </a:p>
+        </p:txBody>
+      </p:sp>
+      <p:sp>
+        <p:nvSpPr>
+          <p:cNvPr id="148" name="Rectangle 8">
+            <a:extLst>
+              <a:ext uri="{FF2B5EF4-FFF2-40B4-BE49-F238E27FC236}">
+                <a16:creationId xmlns:a16="http://schemas.microsoft.com/office/drawing/2014/main" id="{A4123531-61B2-4B2B-B103-18C76E44809C}"/>
+              </a:ext>
+            </a:extLst>
+          </p:cNvPr>
+          <p:cNvSpPr/>
+          <p:nvPr/>
+        </p:nvSpPr>
+        <p:spPr>
+          <a:xfrm>
+            <a:off x="3885280" y="5098619"/>
+            <a:ext cx="1156969" cy="285783"/>
+          </a:xfrm>
+          <a:prstGeom prst="rect">
+            <a:avLst/>
+          </a:prstGeom>
+          <a:ln w="19050">
+            <a:solidFill>
+              <a:srgbClr val="7030A0"/>
+            </a:solidFill>
+          </a:ln>
+          <a:effectLst/>
+        </p:spPr>
+        <p:style>
+          <a:lnRef idx="1">
+            <a:schemeClr val="accent4"/>
+          </a:lnRef>
+          <a:fillRef idx="2">
+            <a:schemeClr val="accent4"/>
+          </a:fillRef>
+          <a:effectRef idx="1">
+            <a:schemeClr val="accent4"/>
+          </a:effectRef>
+          <a:fontRef idx="minor">
+            <a:schemeClr val="dk1"/>
+          </a:fontRef>
+        </p:style>
+        <p:txBody>
+          <a:bodyPr rtlCol="0" anchor="ctr"/>
+          <a:lstStyle/>
+          <a:p>
+            <a:pPr algn="ctr"/>
+            <a:r>
+              <a:rPr lang="en-US" sz="1050" dirty="0" err="1">
+                <a:solidFill>
+                  <a:srgbClr val="7030A0"/>
+                </a:solidFill>
+              </a:rPr>
+              <a:t>UniqueTagList</a:t>
+            </a:r>
+            <a:endParaRPr lang="en-SG" sz="1050" dirty="0">
+              <a:solidFill>
+                <a:srgbClr val="7030A0"/>
+              </a:solidFill>
+            </a:endParaRPr>
+          </a:p>
+        </p:txBody>
+      </p:sp>
+      <p:sp>
+        <p:nvSpPr>
+          <p:cNvPr id="149" name="Rectangle 8">
+            <a:extLst>
+              <a:ext uri="{FF2B5EF4-FFF2-40B4-BE49-F238E27FC236}">
+                <a16:creationId xmlns:a16="http://schemas.microsoft.com/office/drawing/2014/main" id="{F5FE8ACF-168D-4462-9247-2A80B86199C9}"/>
+              </a:ext>
+            </a:extLst>
+          </p:cNvPr>
+          <p:cNvSpPr/>
+          <p:nvPr/>
+        </p:nvSpPr>
+        <p:spPr>
+          <a:xfrm>
+            <a:off x="5812921" y="5060717"/>
+            <a:ext cx="708186" cy="346760"/>
+          </a:xfrm>
+          <a:prstGeom prst="rect">
+            <a:avLst/>
+          </a:prstGeom>
+          <a:ln w="19050">
+            <a:solidFill>
+              <a:srgbClr val="7030A0"/>
+            </a:solidFill>
+          </a:ln>
+          <a:effectLst/>
+        </p:spPr>
+        <p:style>
+          <a:lnRef idx="1">
+            <a:schemeClr val="accent4"/>
+          </a:lnRef>
+          <a:fillRef idx="2">
+            <a:schemeClr val="accent4"/>
+          </a:fillRef>
+          <a:effectRef idx="1">
+            <a:schemeClr val="accent4"/>
+          </a:effectRef>
+          <a:fontRef idx="minor">
+            <a:schemeClr val="dk1"/>
+          </a:fontRef>
+        </p:style>
+        <p:txBody>
+          <a:bodyPr rtlCol="0" anchor="ctr"/>
+          <a:lstStyle/>
+          <a:p>
+            <a:pPr algn="ctr"/>
+            <a:r>
+              <a:rPr lang="en-US" sz="1050" dirty="0">
+                <a:solidFill>
+                  <a:srgbClr val="7030A0"/>
+                </a:solidFill>
+              </a:rPr>
+              <a:t>Tag</a:t>
+            </a:r>
+            <a:endParaRPr lang="en-SG" sz="1050" dirty="0">
+              <a:solidFill>
+                <a:srgbClr val="7030A0"/>
+              </a:solidFill>
+            </a:endParaRPr>
+          </a:p>
+        </p:txBody>
+      </p:sp>
+      <p:sp>
+        <p:nvSpPr>
+          <p:cNvPr id="150" name="Flowchart: Decision 96">
+            <a:extLst>
+              <a:ext uri="{FF2B5EF4-FFF2-40B4-BE49-F238E27FC236}">
+                <a16:creationId xmlns:a16="http://schemas.microsoft.com/office/drawing/2014/main" id="{5FDEAB02-2953-4AEE-9088-26EC1787018C}"/>
+              </a:ext>
+            </a:extLst>
+          </p:cNvPr>
+          <p:cNvSpPr/>
+          <p:nvPr/>
+        </p:nvSpPr>
+        <p:spPr>
+          <a:xfrm>
+            <a:off x="5064363" y="5154820"/>
+            <a:ext cx="236048" cy="173380"/>
+          </a:xfrm>
+          <a:prstGeom prst="flowChartDecision">
+            <a:avLst/>
+          </a:prstGeom>
+          <a:solidFill>
+            <a:srgbClr val="7030A0"/>
+          </a:solidFill>
+          <a:ln w="19050">
+            <a:solidFill>
+              <a:srgbClr val="7030A0"/>
+            </a:solidFill>
+          </a:ln>
+          <a:effectLst/>
+        </p:spPr>
+        <p:style>
+          <a:lnRef idx="1">
+            <a:schemeClr val="accent6"/>
+          </a:lnRef>
+          <a:fillRef idx="2">
+            <a:schemeClr val="accent6"/>
+          </a:fillRef>
+          <a:effectRef idx="1">
+            <a:schemeClr val="accent6"/>
+          </a:effectRef>
+          <a:fontRef idx="minor">
+            <a:schemeClr val="dk1"/>
+          </a:fontRef>
+        </p:style>
+        <p:txBody>
+          <a:bodyPr rtlCol="0" anchor="ctr"/>
+          <a:lstStyle/>
+          <a:p>
+            <a:pPr algn="ctr"/>
+            <a:endParaRPr lang="en-US" sz="1050"/>
+          </a:p>
+        </p:txBody>
+      </p:sp>
+      <p:cxnSp>
+        <p:nvCxnSpPr>
+          <p:cNvPr id="151" name="Straight Arrow Connector 150">
+            <a:extLst>
+              <a:ext uri="{FF2B5EF4-FFF2-40B4-BE49-F238E27FC236}">
+                <a16:creationId xmlns:a16="http://schemas.microsoft.com/office/drawing/2014/main" id="{A2D2303C-A038-4C5F-B60D-7E1A3F30DD5B}"/>
+              </a:ext>
+            </a:extLst>
+          </p:cNvPr>
+          <p:cNvCxnSpPr>
+            <a:cxnSpLocks/>
+            <a:stCxn id="150" idx="3"/>
+            <a:endCxn id="149" idx="1"/>
+          </p:cNvCxnSpPr>
+          <p:nvPr/>
+        </p:nvCxnSpPr>
+        <p:spPr>
+          <a:xfrm flipV="1">
+            <a:off x="5300411" y="5234097"/>
+            <a:ext cx="512510" cy="7413"/>
+          </a:xfrm>
+          <a:prstGeom prst="straightConnector1">
+            <a:avLst/>
+          </a:prstGeom>
+          <a:ln w="19050">
+            <a:solidFill>
+              <a:srgbClr val="7030A0"/>
+            </a:solidFill>
+            <a:headEnd type="none" w="med" len="med"/>
+            <a:tailEnd type="arrow" w="med" len="med"/>
+          </a:ln>
+          <a:effectLst/>
+        </p:spPr>
+        <p:style>
+          <a:lnRef idx="1">
+            <a:schemeClr val="accent2"/>
+          </a:lnRef>
+          <a:fillRef idx="2">
+            <a:schemeClr val="accent2"/>
+          </a:fillRef>
+          <a:effectRef idx="1">
+            <a:schemeClr val="accent2"/>
+          </a:effectRef>
+          <a:fontRef idx="minor">
+            <a:schemeClr val="dk1"/>
+          </a:fontRef>
+        </p:style>
+      </p:cxnSp>
+      <p:cxnSp>
+        <p:nvCxnSpPr>
+          <p:cNvPr id="152" name="Elbow Connector 78">
+            <a:extLst>
+              <a:ext uri="{FF2B5EF4-FFF2-40B4-BE49-F238E27FC236}">
+                <a16:creationId xmlns:a16="http://schemas.microsoft.com/office/drawing/2014/main" id="{0D6046DA-0561-467E-86FB-29DAB4E3A961}"/>
+              </a:ext>
+            </a:extLst>
+          </p:cNvPr>
+          <p:cNvCxnSpPr>
+            <a:cxnSpLocks/>
+            <a:endCxn id="148" idx="1"/>
+          </p:cNvCxnSpPr>
+          <p:nvPr/>
+        </p:nvCxnSpPr>
+        <p:spPr>
+          <a:xfrm rot="16200000" flipH="1">
+            <a:off x="3576395" y="4932626"/>
+            <a:ext cx="426560" cy="191209"/>
+          </a:xfrm>
+          <a:prstGeom prst="bentConnector2">
+            <a:avLst/>
+          </a:prstGeom>
+          <a:ln w="19050">
+            <a:solidFill>
+              <a:srgbClr val="7030A0"/>
+            </a:solidFill>
+            <a:headEnd type="none" w="med" len="med"/>
+            <a:tailEnd type="arrow" w="med" len="med"/>
+          </a:ln>
+          <a:effectLst/>
+        </p:spPr>
+        <p:style>
+          <a:lnRef idx="1">
+            <a:schemeClr val="accent2"/>
+          </a:lnRef>
+          <a:fillRef idx="2">
+            <a:schemeClr val="accent2"/>
+          </a:fillRef>
+          <a:effectRef idx="1">
+            <a:schemeClr val="accent2"/>
+          </a:effectRef>
+          <a:fontRef idx="minor">
+            <a:schemeClr val="dk1"/>
+          </a:fontRef>
+        </p:style>
+      </p:cxnSp>
+      <p:sp>
+        <p:nvSpPr>
+          <p:cNvPr id="153" name="Flowchart: Decision 96">
+            <a:extLst>
+              <a:ext uri="{FF2B5EF4-FFF2-40B4-BE49-F238E27FC236}">
+                <a16:creationId xmlns:a16="http://schemas.microsoft.com/office/drawing/2014/main" id="{807D6F84-3E59-4C37-8D2A-48ACAB9F15DA}"/>
+              </a:ext>
+            </a:extLst>
+          </p:cNvPr>
+          <p:cNvSpPr/>
+          <p:nvPr/>
+        </p:nvSpPr>
+        <p:spPr>
+          <a:xfrm rot="5400000">
+            <a:off x="6168886" y="4190996"/>
+            <a:ext cx="250178" cy="173380"/>
+          </a:xfrm>
+          <a:prstGeom prst="flowChartDecision">
+            <a:avLst/>
+          </a:prstGeom>
+          <a:noFill/>
+          <a:ln w="19050">
+            <a:solidFill>
+              <a:srgbClr val="7030A0"/>
+            </a:solidFill>
+          </a:ln>
+          <a:effectLst/>
+        </p:spPr>
+        <p:style>
+          <a:lnRef idx="1">
+            <a:schemeClr val="accent6"/>
+          </a:lnRef>
+          <a:fillRef idx="2">
+            <a:schemeClr val="accent6"/>
+          </a:fillRef>
+          <a:effectRef idx="1">
+            <a:schemeClr val="accent6"/>
+          </a:effectRef>
+          <a:fontRef idx="minor">
+            <a:schemeClr val="dk1"/>
+          </a:fontRef>
+        </p:style>
+        <p:txBody>
+          <a:bodyPr rtlCol="0" anchor="ctr"/>
+          <a:lstStyle/>
+          <a:p>
+            <a:pPr algn="ctr"/>
+            <a:endParaRPr lang="en-US" sz="1050"/>
+          </a:p>
+        </p:txBody>
+      </p:sp>
+      <p:cxnSp>
+        <p:nvCxnSpPr>
+          <p:cNvPr id="154" name="Straight Arrow Connector 153">
+            <a:extLst>
+              <a:ext uri="{FF2B5EF4-FFF2-40B4-BE49-F238E27FC236}">
+                <a16:creationId xmlns:a16="http://schemas.microsoft.com/office/drawing/2014/main" id="{B38BDD19-037F-4B99-BA59-844DBE7C2A89}"/>
+              </a:ext>
+            </a:extLst>
+          </p:cNvPr>
+          <p:cNvCxnSpPr>
+            <a:cxnSpLocks/>
+            <a:stCxn id="153" idx="3"/>
+          </p:cNvCxnSpPr>
+          <p:nvPr/>
+        </p:nvCxnSpPr>
+        <p:spPr>
+          <a:xfrm>
+            <a:off x="6293975" y="4402775"/>
+            <a:ext cx="10830" cy="656771"/>
+          </a:xfrm>
+          <a:prstGeom prst="straightConnector1">
+            <a:avLst/>
+          </a:prstGeom>
+          <a:ln w="19050">
+            <a:solidFill>
+              <a:srgbClr val="7030A0"/>
+            </a:solidFill>
+            <a:headEnd type="none" w="med" len="med"/>
+            <a:tailEnd type="arrow" w="med" len="med"/>
+          </a:ln>
+          <a:effectLst/>
+        </p:spPr>
+        <p:style>
+          <a:lnRef idx="1">
+            <a:schemeClr val="accent2"/>
+          </a:lnRef>
+          <a:fillRef idx="2">
+            <a:schemeClr val="accent2"/>
+          </a:fillRef>
+          <a:effectRef idx="1">
+            <a:schemeClr val="accent2"/>
+          </a:effectRef>
+          <a:fontRef idx="minor">
+            <a:schemeClr val="dk1"/>
+          </a:fontRef>
+        </p:style>
+      </p:cxnSp>
+      <p:sp>
+        <p:nvSpPr>
+          <p:cNvPr id="156" name="TextBox 155">
+            <a:extLst>
+              <a:ext uri="{FF2B5EF4-FFF2-40B4-BE49-F238E27FC236}">
+                <a16:creationId xmlns:a16="http://schemas.microsoft.com/office/drawing/2014/main" id="{D8FA82B0-4148-4C7C-BB2B-173F23099A95}"/>
+              </a:ext>
+            </a:extLst>
+          </p:cNvPr>
+          <p:cNvSpPr txBox="1"/>
+          <p:nvPr/>
+        </p:nvSpPr>
+        <p:spPr>
+          <a:xfrm>
+            <a:off x="6331523" y="4889469"/>
+            <a:ext cx="189257" cy="178683"/>
+          </a:xfrm>
+          <a:prstGeom prst="rect">
+            <a:avLst/>
+          </a:prstGeom>
+          <a:noFill/>
+        </p:spPr>
+        <p:txBody>
+          <a:bodyPr wrap="square" lIns="0" tIns="0" rIns="0" bIns="0" rtlCol="0">
+            <a:noAutofit/>
+          </a:bodyPr>
+          <a:lstStyle/>
+          <a:p>
+            <a:pPr algn="ctr"/>
+            <a:r>
+              <a:rPr lang="en-US" sz="1100" dirty="0">
+                <a:solidFill>
+                  <a:srgbClr val="7030A0"/>
+                </a:solidFill>
+              </a:rPr>
+              <a:t>*</a:t>
+            </a:r>
+            <a:endParaRPr lang="en-SG" sz="1100" dirty="0">
+              <a:solidFill>
+                <a:srgbClr val="7030A0"/>
+              </a:solidFill>
+            </a:endParaRPr>
+          </a:p>
+        </p:txBody>
+      </p:sp>
+      <p:cxnSp>
+        <p:nvCxnSpPr>
+          <p:cNvPr id="157" name="Connector: Elbow 156">
+            <a:extLst>
+              <a:ext uri="{FF2B5EF4-FFF2-40B4-BE49-F238E27FC236}">
+                <a16:creationId xmlns:a16="http://schemas.microsoft.com/office/drawing/2014/main" id="{8EA136D6-13CB-4E92-AE11-9319C1DF0CD2}"/>
               </a:ext>
             </a:extLst>
           </p:cNvPr>
@@ -7739,8 +8546,96 @@
           <p:nvPr/>
         </p:nvCxnSpPr>
         <p:spPr>
+          <a:xfrm>
+            <a:off x="3497075" y="3451351"/>
+            <a:ext cx="196995" cy="1224000"/>
+          </a:xfrm>
+          <a:prstGeom prst="bentConnector2">
+            <a:avLst/>
+          </a:prstGeom>
+          <a:ln w="19050">
+            <a:solidFill>
+              <a:srgbClr val="7030A0"/>
+            </a:solidFill>
+          </a:ln>
+        </p:spPr>
+        <p:style>
+          <a:lnRef idx="1">
+            <a:schemeClr val="accent1"/>
+          </a:lnRef>
+          <a:fillRef idx="0">
+            <a:schemeClr val="accent1"/>
+          </a:fillRef>
+          <a:effectRef idx="0">
+            <a:schemeClr val="accent1"/>
+          </a:effectRef>
+          <a:fontRef idx="minor">
+            <a:schemeClr val="tx1"/>
+          </a:fontRef>
+        </p:style>
+      </p:cxnSp>
+      <p:cxnSp>
+        <p:nvCxnSpPr>
+          <p:cNvPr id="158" name="Connector: Elbow 157">
+            <a:extLst>
+              <a:ext uri="{FF2B5EF4-FFF2-40B4-BE49-F238E27FC236}">
+                <a16:creationId xmlns:a16="http://schemas.microsoft.com/office/drawing/2014/main" id="{43BB702B-8DD8-4891-8B6D-C4F5D2A911F6}"/>
+              </a:ext>
+            </a:extLst>
+          </p:cNvPr>
+          <p:cNvCxnSpPr>
+            <a:cxnSpLocks/>
+          </p:cNvCxnSpPr>
+          <p:nvPr/>
+        </p:nvCxnSpPr>
+        <p:spPr>
+          <a:xfrm rot="5400000">
+            <a:off x="3578167" y="4670076"/>
+            <a:ext cx="174274" cy="57534"/>
+          </a:xfrm>
+          <a:prstGeom prst="bentConnector3">
+            <a:avLst>
+              <a:gd name="adj1" fmla="val 50000"/>
+            </a:avLst>
+          </a:prstGeom>
+          <a:ln w="19050">
+            <a:solidFill>
+              <a:srgbClr val="7030A0"/>
+            </a:solidFill>
+          </a:ln>
+        </p:spPr>
+        <p:style>
+          <a:lnRef idx="1">
+            <a:schemeClr val="accent1"/>
+          </a:lnRef>
+          <a:fillRef idx="0">
+            <a:schemeClr val="accent1"/>
+          </a:fillRef>
+          <a:effectRef idx="0">
+            <a:schemeClr val="accent1"/>
+          </a:effectRef>
+          <a:fontRef idx="minor">
+            <a:schemeClr val="tx1"/>
+          </a:fontRef>
+        </p:style>
+      </p:cxnSp>
+      <p:cxnSp>
+        <p:nvCxnSpPr>
+          <p:cNvPr id="159" name="Connector: Elbow 158">
+            <a:extLst>
+              <a:ext uri="{FF2B5EF4-FFF2-40B4-BE49-F238E27FC236}">
+                <a16:creationId xmlns:a16="http://schemas.microsoft.com/office/drawing/2014/main" id="{04DDA634-F9A5-4304-93C6-2B85DF0331F9}"/>
+              </a:ext>
+            </a:extLst>
+          </p:cNvPr>
+          <p:cNvCxnSpPr>
+            <a:cxnSpLocks/>
+          </p:cNvCxnSpPr>
+          <p:nvPr/>
+        </p:nvCxnSpPr>
+        <p:spPr>
           <a:xfrm rot="16200000" flipH="1">
-            <a:off x="3906989" y="4303615"/>
+            <a:off x="3599793" y="4751933"/>
             <a:ext cx="130694" cy="57863"/>
           </a:xfrm>
           <a:prstGeom prst="bentConnector3">
@@ -7772,7 +8667,7 @@
     </p:spTree>
     <p:extLst>
       <p:ext uri="{BB962C8B-B14F-4D97-AF65-F5344CB8AC3E}">
-        <p14:creationId xmlns:p14="http://schemas.microsoft.com/office/powerpoint/2010/main" val="2630260835"/>
+        <p14:creationId xmlns:p14="http://schemas.microsoft.com/office/powerpoint/2010/main" val="1825750084"/>
       </p:ext>
     </p:extLst>
   </p:cSld>

</xml_diff>